<commit_message>
powerpoint1 have finished and first code aded"
</commit_message>
<xml_diff>
--- a/machin learning s1.pptx
+++ b/machin learning s1.pptx
@@ -18,6 +18,10 @@
     <p:sldId id="266" r:id="rId12"/>
     <p:sldId id="267" r:id="rId13"/>
     <p:sldId id="268" r:id="rId14"/>
+    <p:sldId id="269" r:id="rId15"/>
+    <p:sldId id="270" r:id="rId16"/>
+    <p:sldId id="271" r:id="rId17"/>
+    <p:sldId id="272" r:id="rId18"/>
   </p:sldIdLst>
   <p:sldSz cx="12192000" cy="6858000"/>
   <p:notesSz cx="6858000" cy="9144000"/>
@@ -4506,7 +4510,11 @@
           <a:bodyPr/>
           <a:lstStyle/>
           <a:p>
-            <a:endParaRPr lang="en-US"/>
+            <a:r>
+              <a:rPr lang="fa-IR" dirty="0"/>
+              <a:t>چالش های الگوریتمی</a:t>
+            </a:r>
+            <a:endParaRPr lang="en-US" dirty="0"/>
           </a:p>
         </p:txBody>
       </p:sp>
@@ -4528,10 +4536,55 @@
         </p:nvSpPr>
         <p:spPr/>
         <p:txBody>
-          <a:bodyPr/>
-          <a:lstStyle/>
-          <a:p>
-            <a:endParaRPr lang="en-US"/>
+          <a:bodyPr>
+            <a:normAutofit/>
+          </a:bodyPr>
+          <a:lstStyle/>
+          <a:p>
+            <a:pPr algn="r" rtl="1"/>
+            <a:r>
+              <a:rPr lang="fa-IR" sz="2400" dirty="0"/>
+              <a:t>به صورت کلی این نوع مشکلا به سه مسله تقسیم می شود </a:t>
+            </a:r>
+          </a:p>
+          <a:p>
+            <a:pPr marL="457200" indent="-457200" algn="r" rtl="1">
+              <a:buFont typeface="+mj-lt"/>
+              <a:buAutoNum type="arabicPeriod"/>
+            </a:pPr>
+            <a:r>
+              <a:rPr lang="en-US" sz="2400" dirty="0">
+                <a:hlinkClick r:id="rId2" action="ppaction://hlinksldjump"/>
+              </a:rPr>
+              <a:t>Overfitting</a:t>
+            </a:r>
+            <a:endParaRPr lang="en-US" sz="2400" dirty="0"/>
+          </a:p>
+          <a:p>
+            <a:pPr marL="457200" indent="-457200" algn="r" rtl="1">
+              <a:buFont typeface="+mj-lt"/>
+              <a:buAutoNum type="arabicPeriod"/>
+            </a:pPr>
+            <a:r>
+              <a:rPr lang="en-US" sz="2400" dirty="0">
+                <a:hlinkClick r:id="rId3" action="ppaction://hlinksldjump"/>
+              </a:rPr>
+              <a:t>Underfitting</a:t>
+            </a:r>
+            <a:endParaRPr lang="en-US" sz="2400" dirty="0"/>
+          </a:p>
+          <a:p>
+            <a:pPr marL="457200" indent="-457200" algn="r" rtl="1">
+              <a:buFont typeface="+mj-lt"/>
+              <a:buAutoNum type="arabicPeriod"/>
+            </a:pPr>
+            <a:r>
+              <a:rPr lang="fa-IR" sz="2400" dirty="0">
+                <a:hlinkClick r:id="rId4" action="ppaction://hlinksldjump"/>
+              </a:rPr>
+              <a:t>زمان </a:t>
+            </a:r>
+            <a:endParaRPr lang="en-US" sz="2400" dirty="0"/>
           </a:p>
         </p:txBody>
       </p:sp>
@@ -4539,6 +4592,453 @@
     <p:extLst>
       <p:ext uri="{BB962C8B-B14F-4D97-AF65-F5344CB8AC3E}">
         <p14:creationId xmlns:p14="http://schemas.microsoft.com/office/powerpoint/2010/main" val="107016727"/>
+      </p:ext>
+    </p:extLst>
+  </p:cSld>
+  <p:clrMapOvr>
+    <a:masterClrMapping/>
+  </p:clrMapOvr>
+</p:sld>
+</file>
+
+<file path=ppt/slides/slide14.xml><?xml version="1.0" encoding="utf-8"?>
+<p:sld xmlns:a="http://schemas.openxmlformats.org/drawingml/2006/main" xmlns:r="http://schemas.openxmlformats.org/officeDocument/2006/relationships" xmlns:p="http://schemas.openxmlformats.org/presentationml/2006/main">
+  <p:cSld>
+    <p:spTree>
+      <p:nvGrpSpPr>
+        <p:cNvPr id="1" name=""/>
+        <p:cNvGrpSpPr/>
+        <p:nvPr/>
+      </p:nvGrpSpPr>
+      <p:grpSpPr>
+        <a:xfrm>
+          <a:off x="0" y="0"/>
+          <a:ext cx="0" cy="0"/>
+          <a:chOff x="0" y="0"/>
+          <a:chExt cx="0" cy="0"/>
+        </a:xfrm>
+      </p:grpSpPr>
+      <p:sp>
+        <p:nvSpPr>
+          <p:cNvPr id="2" name="Title 1">
+            <a:extLst>
+              <a:ext uri="{FF2B5EF4-FFF2-40B4-BE49-F238E27FC236}">
+                <a16:creationId xmlns:a16="http://schemas.microsoft.com/office/drawing/2014/main" id="{B74D10E9-C725-76B7-CF41-F99B7006F9DA}"/>
+              </a:ext>
+            </a:extLst>
+          </p:cNvPr>
+          <p:cNvSpPr>
+            <a:spLocks noGrp="1"/>
+          </p:cNvSpPr>
+          <p:nvPr>
+            <p:ph type="title"/>
+          </p:nvPr>
+        </p:nvSpPr>
+        <p:spPr/>
+        <p:txBody>
+          <a:bodyPr>
+            <a:normAutofit fontScale="90000"/>
+          </a:bodyPr>
+          <a:lstStyle/>
+          <a:p>
+            <a:r>
+              <a:rPr lang="en-US" sz="4800" dirty="0">
+                <a:hlinkClick r:id="rId2" action="ppaction://hlinksldjump"/>
+              </a:rPr>
+              <a:t>Overfitting</a:t>
+            </a:r>
+            <a:br>
+              <a:rPr lang="en-US" sz="4800" dirty="0"/>
+            </a:br>
+            <a:endParaRPr lang="en-US" dirty="0"/>
+          </a:p>
+        </p:txBody>
+      </p:sp>
+      <p:sp>
+        <p:nvSpPr>
+          <p:cNvPr id="3" name="Content Placeholder 2">
+            <a:extLst>
+              <a:ext uri="{FF2B5EF4-FFF2-40B4-BE49-F238E27FC236}">
+                <a16:creationId xmlns:a16="http://schemas.microsoft.com/office/drawing/2014/main" id="{C34703EF-23DA-2DCD-AE93-9B76C91446C3}"/>
+              </a:ext>
+            </a:extLst>
+          </p:cNvPr>
+          <p:cNvSpPr>
+            <a:spLocks noGrp="1"/>
+          </p:cNvSpPr>
+          <p:nvPr>
+            <p:ph idx="1"/>
+          </p:nvPr>
+        </p:nvSpPr>
+        <p:spPr/>
+        <p:txBody>
+          <a:bodyPr>
+            <a:normAutofit/>
+          </a:bodyPr>
+          <a:lstStyle/>
+          <a:p>
+            <a:pPr algn="r" rtl="1"/>
+            <a:r>
+              <a:rPr lang="fa-IR" sz="2400" b="0" i="0" dirty="0">
+                <a:effectLst/>
+                <a:latin typeface="IRANYekan"/>
+              </a:rPr>
+              <a:t>هدف ما در یادگیری‌ماشین این است که با مشاهده و یادگیری از داده‌های گذشته، آینده را پیش‌بینی کنیم. وقتی دچار </a:t>
+            </a:r>
+            <a:r>
+              <a:rPr lang="en-US" sz="2400" b="0" i="1" dirty="0">
+                <a:effectLst/>
+                <a:latin typeface="IRANYekan"/>
+              </a:rPr>
+              <a:t>Overfitting</a:t>
+            </a:r>
+            <a:r>
+              <a:rPr lang="en-US" sz="2400" b="0" i="0" dirty="0">
+                <a:effectLst/>
+                <a:latin typeface="IRANYekan"/>
+              </a:rPr>
+              <a:t> </a:t>
+            </a:r>
+            <a:r>
+              <a:rPr lang="fa-IR" sz="2400" b="0" i="0" dirty="0">
+                <a:effectLst/>
+                <a:latin typeface="IRANYekan"/>
+              </a:rPr>
+              <a:t>می‌شویم در حقیقت مدل عمومیت خود را از دست داده است؛ به عبارت بهتر مدل نمی‌تواند آینده را به درستی پیش‌بینی کند. علت عدم توانایی در پیش‌بینی آینده این است که داده‌های آموزش را زیاد از حد یاد گرفته است.</a:t>
+            </a:r>
+            <a:endParaRPr lang="en-US" sz="2400" dirty="0"/>
+          </a:p>
+        </p:txBody>
+      </p:sp>
+    </p:spTree>
+    <p:extLst>
+      <p:ext uri="{BB962C8B-B14F-4D97-AF65-F5344CB8AC3E}">
+        <p14:creationId xmlns:p14="http://schemas.microsoft.com/office/powerpoint/2010/main" val="3725048656"/>
+      </p:ext>
+    </p:extLst>
+  </p:cSld>
+  <p:clrMapOvr>
+    <a:masterClrMapping/>
+  </p:clrMapOvr>
+</p:sld>
+</file>
+
+<file path=ppt/slides/slide15.xml><?xml version="1.0" encoding="utf-8"?>
+<p:sld xmlns:a="http://schemas.openxmlformats.org/drawingml/2006/main" xmlns:r="http://schemas.openxmlformats.org/officeDocument/2006/relationships" xmlns:p="http://schemas.openxmlformats.org/presentationml/2006/main">
+  <p:cSld>
+    <p:spTree>
+      <p:nvGrpSpPr>
+        <p:cNvPr id="1" name=""/>
+        <p:cNvGrpSpPr/>
+        <p:nvPr/>
+      </p:nvGrpSpPr>
+      <p:grpSpPr>
+        <a:xfrm>
+          <a:off x="0" y="0"/>
+          <a:ext cx="0" cy="0"/>
+          <a:chOff x="0" y="0"/>
+          <a:chExt cx="0" cy="0"/>
+        </a:xfrm>
+      </p:grpSpPr>
+      <p:sp>
+        <p:nvSpPr>
+          <p:cNvPr id="2" name="Title 1">
+            <a:extLst>
+              <a:ext uri="{FF2B5EF4-FFF2-40B4-BE49-F238E27FC236}">
+                <a16:creationId xmlns:a16="http://schemas.microsoft.com/office/drawing/2014/main" id="{254404DC-7AB8-90C5-D9F2-4A6C17B74749}"/>
+              </a:ext>
+            </a:extLst>
+          </p:cNvPr>
+          <p:cNvSpPr>
+            <a:spLocks noGrp="1"/>
+          </p:cNvSpPr>
+          <p:nvPr>
+            <p:ph type="title"/>
+          </p:nvPr>
+        </p:nvSpPr>
+        <p:spPr/>
+        <p:txBody>
+          <a:bodyPr>
+            <a:normAutofit fontScale="90000"/>
+          </a:bodyPr>
+          <a:lstStyle/>
+          <a:p>
+            <a:r>
+              <a:rPr lang="en-US" sz="4800" dirty="0">
+                <a:hlinkClick r:id="rId2" action="ppaction://hlinksldjump"/>
+              </a:rPr>
+              <a:t>Underfitting</a:t>
+            </a:r>
+            <a:br>
+              <a:rPr lang="en-US" sz="4800" dirty="0"/>
+            </a:br>
+            <a:endParaRPr lang="en-US" dirty="0"/>
+          </a:p>
+        </p:txBody>
+      </p:sp>
+      <p:sp>
+        <p:nvSpPr>
+          <p:cNvPr id="3" name="Content Placeholder 2">
+            <a:extLst>
+              <a:ext uri="{FF2B5EF4-FFF2-40B4-BE49-F238E27FC236}">
+                <a16:creationId xmlns:a16="http://schemas.microsoft.com/office/drawing/2014/main" id="{D01C7F16-E3DF-0D09-7EE0-1D985B6B307D}"/>
+              </a:ext>
+            </a:extLst>
+          </p:cNvPr>
+          <p:cNvSpPr>
+            <a:spLocks noGrp="1"/>
+          </p:cNvSpPr>
+          <p:nvPr>
+            <p:ph idx="1"/>
+          </p:nvPr>
+        </p:nvSpPr>
+        <p:spPr/>
+        <p:txBody>
+          <a:bodyPr>
+            <a:normAutofit/>
+          </a:bodyPr>
+          <a:lstStyle/>
+          <a:p>
+            <a:pPr algn="just" rtl="1"/>
+            <a:r>
+              <a:rPr lang="fa-IR" sz="2400" b="0" i="0" dirty="0">
+                <a:effectLst/>
+                <a:latin typeface="IRANYekan"/>
+              </a:rPr>
+              <a:t>این مشکل وقتی به‌وجود می‌آید که مدل نتواند به خوبی از دادگان آموزش، یاد بگیرد. این مسئله می‌تواند به دلایل مختلفی پیش بیاید. </a:t>
+            </a:r>
+            <a:r>
+              <a:rPr lang="fa-IR" sz="2400" b="1" i="0" dirty="0">
+                <a:effectLst/>
+                <a:latin typeface="IRANYekan"/>
+              </a:rPr>
+              <a:t>داده نامناسب</a:t>
+            </a:r>
+            <a:r>
+              <a:rPr lang="fa-IR" sz="2400" b="0" i="0" dirty="0">
+                <a:effectLst/>
+                <a:latin typeface="IRANYekan"/>
+              </a:rPr>
+              <a:t> یکی از چندین دلیل کم‌برازش است.</a:t>
+            </a:r>
+          </a:p>
+          <a:p>
+            <a:pPr algn="just" rtl="1"/>
+            <a:r>
+              <a:rPr lang="fa-IR" sz="2400" b="0" i="0" dirty="0">
+                <a:effectLst/>
+                <a:latin typeface="IRANYekan"/>
+              </a:rPr>
+              <a:t>منظور از </a:t>
+            </a:r>
+            <a:r>
+              <a:rPr lang="fa-IR" sz="2400" b="1" i="0" dirty="0">
+                <a:effectLst/>
+                <a:latin typeface="IRANYekan"/>
+              </a:rPr>
+              <a:t>داده نامناسب</a:t>
+            </a:r>
+            <a:r>
+              <a:rPr lang="fa-IR" sz="2400" b="0" i="0" dirty="0">
+                <a:effectLst/>
+                <a:latin typeface="IRANYekan"/>
+              </a:rPr>
+              <a:t> آن است که داده به قدری بی‌کیفیت است که اطلاعات دقیق و جامعی از هدفی که قصد مدل کردن آن را داریم به دست نمی‌دهد.</a:t>
+            </a:r>
+          </a:p>
+          <a:p>
+            <a:pPr algn="r" rtl="1"/>
+            <a:endParaRPr lang="en-US" sz="2400" dirty="0"/>
+          </a:p>
+        </p:txBody>
+      </p:sp>
+    </p:spTree>
+    <p:extLst>
+      <p:ext uri="{BB962C8B-B14F-4D97-AF65-F5344CB8AC3E}">
+        <p14:creationId xmlns:p14="http://schemas.microsoft.com/office/powerpoint/2010/main" val="1656972928"/>
+      </p:ext>
+    </p:extLst>
+  </p:cSld>
+  <p:clrMapOvr>
+    <a:masterClrMapping/>
+  </p:clrMapOvr>
+</p:sld>
+</file>
+
+<file path=ppt/slides/slide16.xml><?xml version="1.0" encoding="utf-8"?>
+<p:sld xmlns:a="http://schemas.openxmlformats.org/drawingml/2006/main" xmlns:r="http://schemas.openxmlformats.org/officeDocument/2006/relationships" xmlns:p="http://schemas.openxmlformats.org/presentationml/2006/main">
+  <p:cSld>
+    <p:spTree>
+      <p:nvGrpSpPr>
+        <p:cNvPr id="1" name=""/>
+        <p:cNvGrpSpPr/>
+        <p:nvPr/>
+      </p:nvGrpSpPr>
+      <p:grpSpPr>
+        <a:xfrm>
+          <a:off x="0" y="0"/>
+          <a:ext cx="0" cy="0"/>
+          <a:chOff x="0" y="0"/>
+          <a:chExt cx="0" cy="0"/>
+        </a:xfrm>
+      </p:grpSpPr>
+      <p:sp>
+        <p:nvSpPr>
+          <p:cNvPr id="2" name="Title 1">
+            <a:extLst>
+              <a:ext uri="{FF2B5EF4-FFF2-40B4-BE49-F238E27FC236}">
+                <a16:creationId xmlns:a16="http://schemas.microsoft.com/office/drawing/2014/main" id="{E331EF3C-155E-7F76-AD6F-99C3FBE8DA3D}"/>
+              </a:ext>
+            </a:extLst>
+          </p:cNvPr>
+          <p:cNvSpPr>
+            <a:spLocks noGrp="1"/>
+          </p:cNvSpPr>
+          <p:nvPr>
+            <p:ph type="title"/>
+          </p:nvPr>
+        </p:nvSpPr>
+        <p:spPr/>
+        <p:txBody>
+          <a:bodyPr>
+            <a:normAutofit fontScale="90000"/>
+          </a:bodyPr>
+          <a:lstStyle/>
+          <a:p>
+            <a:r>
+              <a:rPr lang="fa-IR" sz="4800" dirty="0">
+                <a:hlinkClick r:id="rId2" action="ppaction://hlinksldjump"/>
+              </a:rPr>
+              <a:t>زمان </a:t>
+            </a:r>
+            <a:br>
+              <a:rPr lang="en-US" sz="4800" dirty="0">
+                <a:hlinkClick r:id="rId2" action="ppaction://hlinksldjump"/>
+              </a:rPr>
+            </a:br>
+            <a:endParaRPr lang="en-US" dirty="0"/>
+          </a:p>
+        </p:txBody>
+      </p:sp>
+      <p:sp>
+        <p:nvSpPr>
+          <p:cNvPr id="3" name="Content Placeholder 2">
+            <a:extLst>
+              <a:ext uri="{FF2B5EF4-FFF2-40B4-BE49-F238E27FC236}">
+                <a16:creationId xmlns:a16="http://schemas.microsoft.com/office/drawing/2014/main" id="{3BF6C5DC-8B41-D690-3198-6C39F1FA649F}"/>
+              </a:ext>
+            </a:extLst>
+          </p:cNvPr>
+          <p:cNvSpPr>
+            <a:spLocks noGrp="1"/>
+          </p:cNvSpPr>
+          <p:nvPr>
+            <p:ph idx="1"/>
+          </p:nvPr>
+        </p:nvSpPr>
+        <p:spPr/>
+        <p:txBody>
+          <a:bodyPr>
+            <a:normAutofit/>
+          </a:bodyPr>
+          <a:lstStyle/>
+          <a:p>
+            <a:pPr algn="r" rtl="1"/>
+            <a:r>
+              <a:rPr lang="fa-IR" sz="2400" b="0" i="0" dirty="0">
+                <a:effectLst/>
+                <a:latin typeface="IRANYekan"/>
+              </a:rPr>
+              <a:t>زمان در یادگیری‌ماشین از دو جهت اهمیت دارد؛ هم مدت زمانی که طول می‌کشد تا آموزش مدل تمام شود، هم زمانی که مدل برای پیش‌بینی نمونه‌ها مصرف می‌کند. مدت زمانی که طول می‌کشد تا آموزش مدل تمام شود، طول مدت توسعه محصول را تحت تاثیر قرار می‌دهد و زمان مصرفی توسط مدل برای پیش‌بینی نمونه‌ها زمانی است که کاربر‌ نهایی تجربه می‌کند. دانشمند داده همواره سعی می‌کند هر دو زمان را کمینه کند.</a:t>
+            </a:r>
+            <a:endParaRPr lang="en-US" sz="2400" dirty="0"/>
+          </a:p>
+        </p:txBody>
+      </p:sp>
+    </p:spTree>
+    <p:extLst>
+      <p:ext uri="{BB962C8B-B14F-4D97-AF65-F5344CB8AC3E}">
+        <p14:creationId xmlns:p14="http://schemas.microsoft.com/office/powerpoint/2010/main" val="3174143418"/>
+      </p:ext>
+    </p:extLst>
+  </p:cSld>
+  <p:clrMapOvr>
+    <a:masterClrMapping/>
+  </p:clrMapOvr>
+</p:sld>
+</file>
+
+<file path=ppt/slides/slide17.xml><?xml version="1.0" encoding="utf-8"?>
+<p:sld xmlns:a="http://schemas.openxmlformats.org/drawingml/2006/main" xmlns:r="http://schemas.openxmlformats.org/officeDocument/2006/relationships" xmlns:p="http://schemas.openxmlformats.org/presentationml/2006/main">
+  <p:cSld>
+    <p:spTree>
+      <p:nvGrpSpPr>
+        <p:cNvPr id="1" name=""/>
+        <p:cNvGrpSpPr/>
+        <p:nvPr/>
+      </p:nvGrpSpPr>
+      <p:grpSpPr>
+        <a:xfrm>
+          <a:off x="0" y="0"/>
+          <a:ext cx="0" cy="0"/>
+          <a:chOff x="0" y="0"/>
+          <a:chExt cx="0" cy="0"/>
+        </a:xfrm>
+      </p:grpSpPr>
+      <p:sp>
+        <p:nvSpPr>
+          <p:cNvPr id="2" name="Title 1">
+            <a:extLst>
+              <a:ext uri="{FF2B5EF4-FFF2-40B4-BE49-F238E27FC236}">
+                <a16:creationId xmlns:a16="http://schemas.microsoft.com/office/drawing/2014/main" id="{E5BC8266-F161-F598-C1B8-911CC0C8AEDA}"/>
+              </a:ext>
+            </a:extLst>
+          </p:cNvPr>
+          <p:cNvSpPr>
+            <a:spLocks noGrp="1"/>
+          </p:cNvSpPr>
+          <p:nvPr>
+            <p:ph type="title"/>
+          </p:nvPr>
+        </p:nvSpPr>
+        <p:spPr/>
+        <p:txBody>
+          <a:bodyPr/>
+          <a:lstStyle/>
+          <a:p>
+            <a:endParaRPr lang="en-US"/>
+          </a:p>
+        </p:txBody>
+      </p:sp>
+      <p:sp>
+        <p:nvSpPr>
+          <p:cNvPr id="3" name="Content Placeholder 2">
+            <a:extLst>
+              <a:ext uri="{FF2B5EF4-FFF2-40B4-BE49-F238E27FC236}">
+                <a16:creationId xmlns:a16="http://schemas.microsoft.com/office/drawing/2014/main" id="{8B7C0C0F-7CBD-8BC8-A385-E8920F98144E}"/>
+              </a:ext>
+            </a:extLst>
+          </p:cNvPr>
+          <p:cNvSpPr>
+            <a:spLocks noGrp="1"/>
+          </p:cNvSpPr>
+          <p:nvPr>
+            <p:ph idx="1"/>
+          </p:nvPr>
+        </p:nvSpPr>
+        <p:spPr/>
+        <p:txBody>
+          <a:bodyPr/>
+          <a:lstStyle/>
+          <a:p>
+            <a:endParaRPr lang="en-US"/>
+          </a:p>
+        </p:txBody>
+      </p:sp>
+    </p:spTree>
+    <p:extLst>
+      <p:ext uri="{BB962C8B-B14F-4D97-AF65-F5344CB8AC3E}">
+        <p14:creationId xmlns:p14="http://schemas.microsoft.com/office/powerpoint/2010/main" val="77527909"/>
       </p:ext>
     </p:extLst>
   </p:cSld>
@@ -5196,8 +5696,8 @@
           </a:p>
         </p:txBody>
       </p:sp>
-      <mc:AlternateContent xmlns:mc="http://schemas.openxmlformats.org/markup-compatibility/2006">
-        <mc:Choice xmlns:p14="http://schemas.microsoft.com/office/powerpoint/2010/main" Requires="p14">
+      <mc:AlternateContent xmlns:mc="http://schemas.openxmlformats.org/markup-compatibility/2006" xmlns:p14="http://schemas.microsoft.com/office/powerpoint/2010/main">
+        <mc:Choice Requires="p14">
           <p:contentPart p14:bwMode="auto" r:id="rId2">
             <p14:nvContentPartPr>
               <p14:cNvPr id="7" name="Ink 6">
@@ -5216,7 +5716,7 @@
             </p14:xfrm>
           </p:contentPart>
         </mc:Choice>
-        <mc:Fallback>
+        <mc:Fallback xmlns="">
           <p:pic>
             <p:nvPicPr>
               <p:cNvPr id="7" name="Ink 6">
@@ -5247,8 +5747,8 @@
           </p:pic>
         </mc:Fallback>
       </mc:AlternateContent>
-      <mc:AlternateContent xmlns:mc="http://schemas.openxmlformats.org/markup-compatibility/2006">
-        <mc:Choice xmlns:p14="http://schemas.microsoft.com/office/powerpoint/2010/main" Requires="p14">
+      <mc:AlternateContent xmlns:mc="http://schemas.openxmlformats.org/markup-compatibility/2006" xmlns:p14="http://schemas.microsoft.com/office/powerpoint/2010/main">
+        <mc:Choice Requires="p14">
           <p:contentPart p14:bwMode="auto" r:id="rId4">
             <p14:nvContentPartPr>
               <p14:cNvPr id="8" name="Ink 7">
@@ -5267,7 +5767,7 @@
             </p14:xfrm>
           </p:contentPart>
         </mc:Choice>
-        <mc:Fallback>
+        <mc:Fallback xmlns="">
           <p:pic>
             <p:nvPicPr>
               <p:cNvPr id="8" name="Ink 7">

</xml_diff>